<commit_message>
updated figures and gravity section
</commit_message>
<xml_diff>
--- a/Images Source/GravitySlides.pptx
+++ b/Images Source/GravitySlides.pptx
@@ -8605,7 +8605,7 @@
         </p:nvSpPr>
         <p:spPr>
           <a:xfrm>
-            <a:off x="4288685" y="1594271"/>
+            <a:off x="4365601" y="1976936"/>
             <a:ext cx="3711762" cy="3669459"/>
           </a:xfrm>
           <a:prstGeom prst="ellipse">
@@ -8657,7 +8657,7 @@
         </p:nvSpPr>
         <p:spPr>
           <a:xfrm rot="-10536482">
-            <a:off x="4826368" y="1862382"/>
+            <a:off x="4903284" y="2245047"/>
             <a:ext cx="310667" cy="350975"/>
           </a:xfrm>
           <a:prstGeom prst="corner">
@@ -8708,7 +8708,7 @@
         </p:nvSpPr>
         <p:spPr>
           <a:xfrm rot="-5691000">
-            <a:off x="7262851" y="1961895"/>
+            <a:off x="7339767" y="2344560"/>
             <a:ext cx="310667" cy="350975"/>
           </a:xfrm>
           <a:prstGeom prst="corner">
@@ -8759,7 +8759,7 @@
         </p:nvSpPr>
         <p:spPr>
           <a:xfrm rot="262322">
-            <a:off x="7359610" y="4507523"/>
+            <a:off x="7436526" y="4890188"/>
             <a:ext cx="310667" cy="350975"/>
           </a:xfrm>
           <a:prstGeom prst="corner">
@@ -8810,7 +8810,7 @@
         </p:nvSpPr>
         <p:spPr>
           <a:xfrm rot="5400000">
-            <a:off x="4953226" y="4781885"/>
+            <a:off x="5030142" y="5164550"/>
             <a:ext cx="310667" cy="350975"/>
           </a:xfrm>
           <a:prstGeom prst="corner">
@@ -8861,7 +8861,7 @@
         </p:nvSpPr>
         <p:spPr>
           <a:xfrm rot="-10536482">
-            <a:off x="4900328" y="1790316"/>
+            <a:off x="4977244" y="2172981"/>
             <a:ext cx="310667" cy="350975"/>
           </a:xfrm>
           <a:prstGeom prst="corner">
@@ -8912,7 +8912,7 @@
         </p:nvSpPr>
         <p:spPr>
           <a:xfrm rot="-5633214">
-            <a:off x="7341423" y="2026169"/>
+            <a:off x="7418339" y="2408834"/>
             <a:ext cx="310667" cy="350975"/>
           </a:xfrm>
           <a:prstGeom prst="corner">
@@ -8963,7 +8963,7 @@
         </p:nvSpPr>
         <p:spPr>
           <a:xfrm>
-            <a:off x="5584728" y="873125"/>
+            <a:off x="3005683" y="4125615"/>
             <a:ext cx="1408012" cy="369332"/>
           </a:xfrm>
           <a:prstGeom prst="rect">
@@ -8990,7 +8990,7 @@
               <a:buNone/>
             </a:pPr>
             <a:r>
-              <a:rPr lang="en-US" sz="1800" b="1" i="0" u="none" strike="noStrike" cap="none">
+              <a:rPr lang="en-US" sz="1800" b="1" i="0" u="none" strike="noStrike" cap="none" dirty="0">
                 <a:solidFill>
                   <a:srgbClr val="44546A"/>
                 </a:solidFill>
@@ -9001,7 +9001,7 @@
               </a:rPr>
               <a:t>Screening</a:t>
             </a:r>
-            <a:endParaRPr/>
+            <a:endParaRPr dirty="0"/>
           </a:p>
         </p:txBody>
       </p:sp>
@@ -9013,8 +9013,8 @@
         </p:nvSpPr>
         <p:spPr>
           <a:xfrm>
-            <a:off x="8581135" y="3059667"/>
-            <a:ext cx="2471178" cy="307777"/>
+            <a:off x="5135716" y="443049"/>
+            <a:ext cx="3093328" cy="369291"/>
           </a:xfrm>
           <a:prstGeom prst="rect">
             <a:avLst/>
@@ -9040,7 +9040,7 @@
               <a:buNone/>
             </a:pPr>
             <a:r>
-              <a:rPr lang="en-US" sz="1800" b="1" i="0" u="none" strike="noStrike" cap="none">
+              <a:rPr lang="en-US" sz="1800" b="1" i="0" u="none" strike="noStrike" cap="none" dirty="0">
                 <a:solidFill>
                   <a:srgbClr val="44546A"/>
                 </a:solidFill>
@@ -9049,9 +9049,9 @@
                 <a:cs typeface="Arial"/>
                 <a:sym typeface="Arial"/>
               </a:rPr>
-              <a:t>Assessment/ Diagnosis</a:t>
+              <a:t>Assessment/Diagnosis</a:t>
             </a:r>
-            <a:endParaRPr/>
+            <a:endParaRPr dirty="0"/>
           </a:p>
         </p:txBody>
       </p:sp>
@@ -9063,7 +9063,7 @@
         </p:nvSpPr>
         <p:spPr>
           <a:xfrm>
-            <a:off x="4761700" y="5669102"/>
+            <a:off x="7251432" y="4268860"/>
             <a:ext cx="3183337" cy="369332"/>
           </a:xfrm>
           <a:prstGeom prst="rect">
@@ -9090,7 +9090,7 @@
               <a:buNone/>
             </a:pPr>
             <a:r>
-              <a:rPr lang="en-US" sz="1800" b="1" i="0" u="none" strike="noStrike" cap="none">
+              <a:rPr lang="en-US" sz="1800" b="1" i="0" u="none" strike="noStrike" cap="none" dirty="0">
                 <a:solidFill>
                   <a:srgbClr val="44546A"/>
                 </a:solidFill>
@@ -9101,7 +9101,7 @@
               </a:rPr>
               <a:t>Goals Setting</a:t>
             </a:r>
-            <a:endParaRPr/>
+            <a:endParaRPr dirty="0"/>
           </a:p>
         </p:txBody>
       </p:sp>
@@ -9113,8 +9113,8 @@
         </p:nvSpPr>
         <p:spPr>
           <a:xfrm>
-            <a:off x="674473" y="3213555"/>
-            <a:ext cx="2620125" cy="307777"/>
+            <a:off x="6787107" y="6414951"/>
+            <a:ext cx="3116250" cy="369291"/>
           </a:xfrm>
           <a:prstGeom prst="rect">
             <a:avLst/>
@@ -9140,7 +9140,7 @@
               <a:buNone/>
             </a:pPr>
             <a:r>
-              <a:rPr lang="en-US" sz="1800" b="1" i="0" u="none" strike="noStrike" cap="none">
+              <a:rPr lang="en-US" sz="1800" b="1" i="0" u="none" strike="noStrike" cap="none" dirty="0">
                 <a:solidFill>
                   <a:srgbClr val="44546A"/>
                 </a:solidFill>
@@ -9149,9 +9149,9 @@
                 <a:cs typeface="Arial"/>
                 <a:sym typeface="Arial"/>
               </a:rPr>
-              <a:t>Treatment/ Interventions</a:t>
+              <a:t>Treatment/Interventions</a:t>
             </a:r>
-            <a:endParaRPr/>
+            <a:endParaRPr dirty="0"/>
           </a:p>
         </p:txBody>
       </p:sp>
@@ -9163,7 +9163,7 @@
         </p:nvSpPr>
         <p:spPr>
           <a:xfrm rot="220145">
-            <a:off x="7272342" y="4584141"/>
+            <a:off x="7349258" y="4966806"/>
             <a:ext cx="310667" cy="350975"/>
           </a:xfrm>
           <a:prstGeom prst="corner">
@@ -9214,7 +9214,7 @@
         </p:nvSpPr>
         <p:spPr>
           <a:xfrm rot="5400000">
-            <a:off x="4877316" y="4717827"/>
+            <a:off x="4954232" y="5100492"/>
             <a:ext cx="310667" cy="350975"/>
           </a:xfrm>
           <a:prstGeom prst="corner">
@@ -9272,7 +9272,7 @@
         </p:blipFill>
         <p:spPr>
           <a:xfrm>
-            <a:off x="3928458" y="3337385"/>
+            <a:off x="5376502" y="5079925"/>
             <a:ext cx="871176" cy="906980"/>
           </a:xfrm>
           <a:prstGeom prst="ellipse">
@@ -9299,7 +9299,7 @@
         </p:blipFill>
         <p:spPr>
           <a:xfrm>
-            <a:off x="3020078" y="2965269"/>
+            <a:off x="6502433" y="5023568"/>
             <a:ext cx="941343" cy="860592"/>
           </a:xfrm>
           <a:prstGeom prst="ellipse">
@@ -9326,7 +9326,7 @@
         </p:blipFill>
         <p:spPr>
           <a:xfrm>
-            <a:off x="3792161" y="2323662"/>
+            <a:off x="5915931" y="5750409"/>
             <a:ext cx="969539" cy="897116"/>
           </a:xfrm>
           <a:prstGeom prst="ellipse">
@@ -9338,87 +9338,108 @@
           </a:ln>
         </p:spPr>
       </p:pic>
-      <p:sp>
-        <p:nvSpPr>
-          <p:cNvPr id="468" name="Google Shape;468;p10"/>
-          <p:cNvSpPr/>
+      <p:grpSp>
+        <p:nvGrpSpPr>
+          <p:cNvPr id="3" name="Group 2">
+            <a:extLst>
+              <a:ext uri="{FF2B5EF4-FFF2-40B4-BE49-F238E27FC236}">
+                <a16:creationId xmlns:a16="http://schemas.microsoft.com/office/drawing/2014/main" id="{90785A58-5E14-6112-3128-8DF1B64E4CDE}"/>
+              </a:ext>
+            </a:extLst>
+          </p:cNvPr>
+          <p:cNvGrpSpPr/>
           <p:nvPr/>
-        </p:nvSpPr>
-        <p:spPr>
+        </p:nvGrpSpPr>
+        <p:grpSpPr>
           <a:xfrm>
-            <a:off x="5688474" y="1215717"/>
+            <a:off x="3206984" y="3118493"/>
             <a:ext cx="901661" cy="897115"/>
+            <a:chOff x="3206984" y="3294283"/>
+            <a:chExt cx="901661" cy="897115"/>
           </a:xfrm>
-          <a:prstGeom prst="ellipse">
-            <a:avLst/>
-          </a:prstGeom>
-          <a:solidFill>
-            <a:schemeClr val="lt1"/>
-          </a:solidFill>
-          <a:ln w="25400" cap="flat" cmpd="sng">
+        </p:grpSpPr>
+        <p:sp>
+          <p:nvSpPr>
+            <p:cNvPr id="468" name="Google Shape;468;p10"/>
+            <p:cNvSpPr/>
+            <p:nvPr/>
+          </p:nvSpPr>
+          <p:spPr>
+            <a:xfrm>
+              <a:off x="3206984" y="3294283"/>
+              <a:ext cx="901661" cy="897115"/>
+            </a:xfrm>
+            <a:prstGeom prst="ellipse">
+              <a:avLst/>
+            </a:prstGeom>
             <a:solidFill>
-              <a:srgbClr val="050913"/>
+              <a:schemeClr val="lt1"/>
             </a:solidFill>
-            <a:prstDash val="solid"/>
-            <a:round/>
-            <a:headEnd type="none" w="sm" len="sm"/>
-            <a:tailEnd type="none" w="sm" len="sm"/>
-          </a:ln>
-        </p:spPr>
-        <p:txBody>
-          <a:bodyPr spcFirstLastPara="1" wrap="square" lIns="91425" tIns="45700" rIns="91425" bIns="45700" anchor="ctr" anchorCtr="0">
-            <a:noAutofit/>
-          </a:bodyPr>
-          <a:lstStyle/>
-          <a:p>
-            <a:pPr marL="0" marR="0" lvl="0" indent="0" algn="ctr" rtl="0">
-              <a:spcBef>
-                <a:spcPts val="0"/>
-              </a:spcBef>
-              <a:spcAft>
-                <a:spcPts val="0"/>
-              </a:spcAft>
-              <a:buNone/>
-            </a:pPr>
-            <a:endParaRPr sz="1800" b="0" i="0" u="none" strike="noStrike" cap="none">
+            <a:ln w="25400" cap="flat" cmpd="sng">
               <a:solidFill>
-                <a:schemeClr val="lt1"/>
+                <a:srgbClr val="050913"/>
               </a:solidFill>
-              <a:latin typeface="Arial"/>
-              <a:ea typeface="Arial"/>
-              <a:cs typeface="Arial"/>
-              <a:sym typeface="Arial"/>
-            </a:endParaRPr>
-          </a:p>
-        </p:txBody>
-      </p:sp>
-      <p:pic>
-        <p:nvPicPr>
-          <p:cNvPr id="469" name="Google Shape;469;p10"/>
-          <p:cNvPicPr preferRelativeResize="0"/>
-          <p:nvPr/>
-        </p:nvPicPr>
-        <p:blipFill rotWithShape="1">
-          <a:blip r:embed="rId6">
-            <a:alphaModFix/>
-          </a:blip>
-          <a:srcRect/>
-          <a:stretch/>
-        </p:blipFill>
-        <p:spPr>
-          <a:xfrm>
-            <a:off x="5835172" y="1356238"/>
-            <a:ext cx="610812" cy="610812"/>
-          </a:xfrm>
-          <a:prstGeom prst="rect">
-            <a:avLst/>
-          </a:prstGeom>
-          <a:noFill/>
-          <a:ln>
+              <a:prstDash val="solid"/>
+              <a:round/>
+              <a:headEnd type="none" w="sm" len="sm"/>
+              <a:tailEnd type="none" w="sm" len="sm"/>
+            </a:ln>
+          </p:spPr>
+          <p:txBody>
+            <a:bodyPr spcFirstLastPara="1" wrap="square" lIns="91425" tIns="45700" rIns="91425" bIns="45700" anchor="ctr" anchorCtr="0">
+              <a:noAutofit/>
+            </a:bodyPr>
+            <a:lstStyle/>
+            <a:p>
+              <a:pPr marL="0" marR="0" lvl="0" indent="0" algn="ctr" rtl="0">
+                <a:spcBef>
+                  <a:spcPts val="0"/>
+                </a:spcBef>
+                <a:spcAft>
+                  <a:spcPts val="0"/>
+                </a:spcAft>
+                <a:buNone/>
+              </a:pPr>
+              <a:endParaRPr sz="1800" b="0" i="0" u="none" strike="noStrike" cap="none">
+                <a:solidFill>
+                  <a:schemeClr val="lt1"/>
+                </a:solidFill>
+                <a:latin typeface="Arial"/>
+                <a:ea typeface="Arial"/>
+                <a:cs typeface="Arial"/>
+                <a:sym typeface="Arial"/>
+              </a:endParaRPr>
+            </a:p>
+          </p:txBody>
+        </p:sp>
+        <p:pic>
+          <p:nvPicPr>
+            <p:cNvPr id="469" name="Google Shape;469;p10"/>
+            <p:cNvPicPr preferRelativeResize="0"/>
+            <p:nvPr/>
+          </p:nvPicPr>
+          <p:blipFill rotWithShape="1">
+            <a:blip r:embed="rId6">
+              <a:alphaModFix/>
+            </a:blip>
+            <a:srcRect/>
+            <a:stretch/>
+          </p:blipFill>
+          <p:spPr>
+            <a:xfrm>
+              <a:off x="3346684" y="3473005"/>
+              <a:ext cx="610812" cy="610812"/>
+            </a:xfrm>
+            <a:prstGeom prst="rect">
+              <a:avLst/>
+            </a:prstGeom>
             <a:noFill/>
-          </a:ln>
-        </p:spPr>
-      </p:pic>
+            <a:ln>
+              <a:noFill/>
+            </a:ln>
+          </p:spPr>
+        </p:pic>
+      </p:grpSp>
       <p:pic>
         <p:nvPicPr>
           <p:cNvPr id="470" name="Google Shape;470;p10"/>
@@ -9434,7 +9455,7 @@
         </p:blipFill>
         <p:spPr>
           <a:xfrm>
-            <a:off x="5628189" y="4610508"/>
+            <a:off x="8006152" y="3118493"/>
             <a:ext cx="1270000" cy="1270000"/>
           </a:xfrm>
           <a:prstGeom prst="rect">
@@ -9454,7 +9475,7 @@
         </p:nvSpPr>
         <p:spPr>
           <a:xfrm>
-            <a:off x="7547100" y="2909633"/>
+            <a:off x="5915931" y="918800"/>
             <a:ext cx="871176" cy="951352"/>
           </a:xfrm>
           <a:prstGeom prst="ellipse">
@@ -9515,7 +9536,7 @@
         </p:blipFill>
         <p:spPr>
           <a:xfrm>
-            <a:off x="7682370" y="3092609"/>
+            <a:off x="6051201" y="1101776"/>
             <a:ext cx="625287" cy="625287"/>
           </a:xfrm>
           <a:prstGeom prst="rect">
@@ -9535,7 +9556,7 @@
         </p:nvSpPr>
         <p:spPr>
           <a:xfrm>
-            <a:off x="8321151" y="3756407"/>
+            <a:off x="4807595" y="1526578"/>
             <a:ext cx="560393" cy="589024"/>
           </a:xfrm>
           <a:prstGeom prst="ellipse">
@@ -9572,7 +9593,7 @@
               <a:buNone/>
             </a:pPr>
             <a:r>
-              <a:rPr lang="en-US" sz="2400" b="0" i="0" u="none" strike="noStrike" cap="none">
+              <a:rPr lang="en-US" sz="2400" b="0" i="0" u="none" strike="noStrike" cap="none" dirty="0">
                 <a:solidFill>
                   <a:srgbClr val="1F3764"/>
                 </a:solidFill>
@@ -9583,20 +9604,20 @@
               </a:rPr>
               <a:t>1</a:t>
             </a:r>
-            <a:endParaRPr/>
+            <a:endParaRPr dirty="0"/>
           </a:p>
         </p:txBody>
       </p:sp>
       <p:sp>
         <p:nvSpPr>
-          <p:cNvPr id="475" name="Google Shape;475;p10"/>
+          <p:cNvPr id="476" name="Google Shape;476;p10"/>
           <p:cNvSpPr txBox="1"/>
           <p:nvPr/>
         </p:nvSpPr>
         <p:spPr>
           <a:xfrm>
-            <a:off x="8321151" y="4477644"/>
-            <a:ext cx="3623978" cy="646331"/>
+            <a:off x="8598129" y="4919284"/>
+            <a:ext cx="3280607" cy="923289"/>
           </a:xfrm>
           <a:prstGeom prst="rect">
             <a:avLst/>
@@ -9612,7 +9633,7 @@
           </a:bodyPr>
           <a:lstStyle/>
           <a:p>
-            <a:pPr marL="0" marR="0" lvl="0" indent="0" algn="l" rtl="0">
+            <a:pPr marL="0" marR="0" lvl="0" indent="0" rtl="0">
               <a:spcBef>
                 <a:spcPts val="0"/>
               </a:spcBef>
@@ -9622,57 +9643,7 @@
               <a:buNone/>
             </a:pPr>
             <a:r>
-              <a:rPr lang="en-US" sz="1800" b="0" i="0" u="none" strike="noStrike" cap="none">
-                <a:solidFill>
-                  <a:srgbClr val="555857"/>
-                </a:solidFill>
-                <a:latin typeface="Arial"/>
-                <a:ea typeface="Arial"/>
-                <a:cs typeface="Arial"/>
-                <a:sym typeface="Arial"/>
-              </a:rPr>
-              <a:t>Gather SDOH data in conjunction with a patient encounter.</a:t>
-            </a:r>
-            <a:endParaRPr/>
-          </a:p>
-        </p:txBody>
-      </p:sp>
-      <p:sp>
-        <p:nvSpPr>
-          <p:cNvPr id="476" name="Google Shape;476;p10"/>
-          <p:cNvSpPr txBox="1"/>
-          <p:nvPr/>
-        </p:nvSpPr>
-        <p:spPr>
-          <a:xfrm>
-            <a:off x="499143" y="4233163"/>
-            <a:ext cx="2667208" cy="1200329"/>
-          </a:xfrm>
-          <a:prstGeom prst="rect">
-            <a:avLst/>
-          </a:prstGeom>
-          <a:noFill/>
-          <a:ln>
-            <a:noFill/>
-          </a:ln>
-        </p:spPr>
-        <p:txBody>
-          <a:bodyPr spcFirstLastPara="1" wrap="square" lIns="91425" tIns="45700" rIns="91425" bIns="45700" anchor="t" anchorCtr="0">
-            <a:spAutoFit/>
-          </a:bodyPr>
-          <a:lstStyle/>
-          <a:p>
-            <a:pPr marL="0" marR="0" lvl="0" indent="0" algn="r" rtl="0">
-              <a:spcBef>
-                <a:spcPts val="0"/>
-              </a:spcBef>
-              <a:spcAft>
-                <a:spcPts val="0"/>
-              </a:spcAft>
-              <a:buNone/>
-            </a:pPr>
-            <a:r>
-              <a:rPr lang="en-US" sz="1800" b="0" i="0" u="none" strike="noStrike" cap="none">
+              <a:rPr lang="en-US" sz="1800" b="0" i="0" u="none" strike="noStrike" cap="none" dirty="0">
                 <a:solidFill>
                   <a:srgbClr val="555857"/>
                 </a:solidFill>
@@ -9683,7 +9654,7 @@
               </a:rPr>
               <a:t>Document and track SDOH related interventions to completion. </a:t>
             </a:r>
-            <a:endParaRPr/>
+            <a:endParaRPr dirty="0"/>
           </a:p>
         </p:txBody>
       </p:sp>
@@ -9695,7 +9666,7 @@
         </p:nvSpPr>
         <p:spPr>
           <a:xfrm>
-            <a:off x="3294598" y="4257954"/>
+            <a:off x="7946357" y="5086416"/>
             <a:ext cx="560393" cy="589024"/>
           </a:xfrm>
           <a:prstGeom prst="ellipse">
@@ -9732,7 +9703,7 @@
               <a:buNone/>
             </a:pPr>
             <a:r>
-              <a:rPr lang="en-US" sz="2400" b="0" i="0" u="none" strike="noStrike" cap="none">
+              <a:rPr lang="en-US" sz="2400" b="0" i="0" u="none" strike="noStrike" cap="none" dirty="0">
                 <a:solidFill>
                   <a:srgbClr val="1F3764"/>
                 </a:solidFill>
@@ -9743,7 +9714,7 @@
               </a:rPr>
               <a:t>2</a:t>
             </a:r>
-            <a:endParaRPr/>
+            <a:endParaRPr dirty="0"/>
           </a:p>
         </p:txBody>
       </p:sp>
@@ -9755,7 +9726,7 @@
         </p:nvSpPr>
         <p:spPr>
           <a:xfrm>
-            <a:off x="1424881" y="1136123"/>
+            <a:off x="1140087" y="4919243"/>
             <a:ext cx="2667208" cy="923330"/>
           </a:xfrm>
           <a:prstGeom prst="rect">
@@ -9782,7 +9753,7 @@
               <a:buNone/>
             </a:pPr>
             <a:r>
-              <a:rPr lang="en-US" sz="1800" b="0" i="0" u="none" strike="noStrike" cap="none">
+              <a:rPr lang="en-US" sz="1800" b="0" i="0" u="none" strike="noStrike" cap="none" dirty="0">
                 <a:solidFill>
                   <a:srgbClr val="555857"/>
                 </a:solidFill>
@@ -9793,7 +9764,7 @@
               </a:rPr>
               <a:t>Gather and aggregate SDOH data for uses beyond point of care.</a:t>
             </a:r>
-            <a:endParaRPr/>
+            <a:endParaRPr dirty="0"/>
           </a:p>
         </p:txBody>
       </p:sp>
@@ -9805,7 +9776,7 @@
         </p:nvSpPr>
         <p:spPr>
           <a:xfrm>
-            <a:off x="4220336" y="1160914"/>
+            <a:off x="4151300" y="5049446"/>
             <a:ext cx="560393" cy="589024"/>
           </a:xfrm>
           <a:prstGeom prst="ellipse">
@@ -9842,7 +9813,7 @@
               <a:buNone/>
             </a:pPr>
             <a:r>
-              <a:rPr lang="en-US" sz="2400" b="0" i="0" u="none" strike="noStrike" cap="none">
+              <a:rPr lang="en-US" sz="2400" b="0" i="0" u="none" strike="noStrike" cap="none" dirty="0">
                 <a:solidFill>
                   <a:srgbClr val="1F3764"/>
                 </a:solidFill>
@@ -9853,109 +9824,7 @@
               </a:rPr>
               <a:t>3</a:t>
             </a:r>
-            <a:endParaRPr/>
-          </a:p>
-        </p:txBody>
-      </p:sp>
-      <p:sp>
-        <p:nvSpPr>
-          <p:cNvPr id="480" name="Google Shape;480;p10"/>
-          <p:cNvSpPr txBox="1"/>
-          <p:nvPr/>
-        </p:nvSpPr>
-        <p:spPr>
-          <a:xfrm>
-            <a:off x="8708707" y="1160807"/>
-            <a:ext cx="2848865" cy="1477328"/>
-          </a:xfrm>
-          <a:prstGeom prst="rect">
-            <a:avLst/>
-          </a:prstGeom>
-          <a:noFill/>
-          <a:ln>
-            <a:noFill/>
-          </a:ln>
-        </p:spPr>
-        <p:txBody>
-          <a:bodyPr spcFirstLastPara="1" wrap="square" lIns="91425" tIns="45700" rIns="91425" bIns="45700" anchor="t" anchorCtr="0">
-            <a:spAutoFit/>
-          </a:bodyPr>
-          <a:lstStyle/>
-          <a:p>
-            <a:pPr marL="0" marR="0" lvl="0" indent="0" algn="l" rtl="0">
-              <a:spcBef>
-                <a:spcPts val="0"/>
-              </a:spcBef>
-              <a:spcAft>
-                <a:spcPts val="0"/>
-              </a:spcAft>
-              <a:buNone/>
-            </a:pPr>
-            <a:r>
-              <a:rPr lang="en-US" sz="1800" b="0" i="0" u="none" strike="noStrike" cap="none">
-                <a:solidFill>
-                  <a:schemeClr val="accent1"/>
-                </a:solidFill>
-                <a:latin typeface="Arial"/>
-                <a:ea typeface="Arial"/>
-                <a:cs typeface="Arial"/>
-                <a:sym typeface="Arial"/>
-              </a:rPr>
-              <a:t>Gravity is AGNOSTIC to the systems and tools used to collect, exchange, aggregate, and analyze social care data. </a:t>
-            </a:r>
-            <a:endParaRPr/>
-          </a:p>
-        </p:txBody>
-      </p:sp>
-      <p:sp>
-        <p:nvSpPr>
-          <p:cNvPr id="481" name="Google Shape;481;p10"/>
-          <p:cNvSpPr/>
-          <p:nvPr/>
-        </p:nvSpPr>
-        <p:spPr>
-          <a:xfrm>
-            <a:off x="8412002" y="1178961"/>
-            <a:ext cx="284491" cy="307777"/>
-          </a:xfrm>
-          <a:prstGeom prst="star5">
-            <a:avLst>
-              <a:gd name="adj" fmla="val 19098"/>
-              <a:gd name="hf" fmla="val 105146"/>
-              <a:gd name="vf" fmla="val 110557"/>
-            </a:avLst>
-          </a:prstGeom>
-          <a:solidFill>
-            <a:srgbClr val="FFC000"/>
-          </a:solidFill>
-          <a:ln>
-            <a:noFill/>
-          </a:ln>
-        </p:spPr>
-        <p:txBody>
-          <a:bodyPr spcFirstLastPara="1" wrap="square" lIns="91425" tIns="45700" rIns="91425" bIns="45700" anchor="ctr" anchorCtr="0">
-            <a:noAutofit/>
-          </a:bodyPr>
-          <a:lstStyle/>
-          <a:p>
-            <a:pPr marL="0" marR="0" lvl="0" indent="0" algn="ctr" rtl="0">
-              <a:spcBef>
-                <a:spcPts val="0"/>
-              </a:spcBef>
-              <a:spcAft>
-                <a:spcPts val="0"/>
-              </a:spcAft>
-              <a:buNone/>
-            </a:pPr>
-            <a:endParaRPr sz="1800">
-              <a:solidFill>
-                <a:schemeClr val="lt1"/>
-              </a:solidFill>
-              <a:latin typeface="Arial"/>
-              <a:ea typeface="Arial"/>
-              <a:cs typeface="Arial"/>
-              <a:sym typeface="Arial"/>
-            </a:endParaRPr>
+            <a:endParaRPr dirty="0"/>
           </a:p>
         </p:txBody>
       </p:sp>
@@ -10007,6 +9876,62 @@
               <a:t>1</a:t>
             </a:fld>
             <a:endParaRPr/>
+          </a:p>
+        </p:txBody>
+      </p:sp>
+      <p:sp>
+        <p:nvSpPr>
+          <p:cNvPr id="2" name="Google Shape;478;p10">
+            <a:extLst>
+              <a:ext uri="{FF2B5EF4-FFF2-40B4-BE49-F238E27FC236}">
+                <a16:creationId xmlns:a16="http://schemas.microsoft.com/office/drawing/2014/main" id="{A28EFB0E-210E-E444-393D-296BE5EADA4D}"/>
+              </a:ext>
+            </a:extLst>
+          </p:cNvPr>
+          <p:cNvSpPr txBox="1"/>
+          <p:nvPr/>
+        </p:nvSpPr>
+        <p:spPr>
+          <a:xfrm>
+            <a:off x="1698013" y="1219530"/>
+            <a:ext cx="2667208" cy="923289"/>
+          </a:xfrm>
+          <a:prstGeom prst="rect">
+            <a:avLst/>
+          </a:prstGeom>
+          <a:noFill/>
+          <a:ln>
+            <a:noFill/>
+          </a:ln>
+        </p:spPr>
+        <p:txBody>
+          <a:bodyPr spcFirstLastPara="1" wrap="square" lIns="91425" tIns="45700" rIns="91425" bIns="45700" anchor="t" anchorCtr="0">
+            <a:spAutoFit/>
+          </a:bodyPr>
+          <a:lstStyle/>
+          <a:p>
+            <a:pPr marL="0" marR="0" lvl="0" indent="0" algn="r" rtl="0">
+              <a:spcBef>
+                <a:spcPts val="0"/>
+              </a:spcBef>
+              <a:spcAft>
+                <a:spcPts val="0"/>
+              </a:spcAft>
+              <a:buNone/>
+            </a:pPr>
+            <a:r>
+              <a:rPr lang="en-US" sz="1800" b="0" i="0" u="none" strike="noStrike" cap="none" dirty="0">
+                <a:solidFill>
+                  <a:srgbClr val="555857"/>
+                </a:solidFill>
+                <a:latin typeface="Arial"/>
+                <a:ea typeface="Arial"/>
+                <a:cs typeface="Arial"/>
+                <a:sym typeface="Arial"/>
+              </a:rPr>
+              <a:t>Gather SDOH data in conjunction with a patient encounter.</a:t>
+            </a:r>
+            <a:endParaRPr dirty="0"/>
           </a:p>
         </p:txBody>
       </p:sp>
@@ -10090,7 +10015,9 @@
           <a:noFill/>
           <a:ln w="152400" cap="flat" cmpd="sng">
             <a:solidFill>
-              <a:srgbClr val="DCDDF2"/>
+              <a:schemeClr val="tx2">
+                <a:lumMod val="90000"/>
+              </a:schemeClr>
             </a:solidFill>
             <a:prstDash val="solid"/>
             <a:round/>
@@ -10180,7 +10107,9 @@
           <a:noFill/>
           <a:ln w="152400" cap="flat" cmpd="sng">
             <a:solidFill>
-              <a:srgbClr val="DCDDF2"/>
+              <a:schemeClr val="tx2">
+                <a:lumMod val="90000"/>
+              </a:schemeClr>
             </a:solidFill>
             <a:prstDash val="solid"/>
             <a:round/>
@@ -11147,454 +11076,14 @@
       </p:sp>
       <p:sp>
         <p:nvSpPr>
-          <p:cNvPr id="504" name="Google Shape;504;p11"/>
-          <p:cNvSpPr/>
-          <p:nvPr/>
-        </p:nvSpPr>
-        <p:spPr>
-          <a:xfrm>
-            <a:off x="3390634" y="3937726"/>
-            <a:ext cx="68661" cy="68661"/>
-          </a:xfrm>
-          <a:prstGeom prst="ellipse">
-            <a:avLst/>
-          </a:prstGeom>
-          <a:solidFill>
-            <a:schemeClr val="lt1"/>
-          </a:solidFill>
-          <a:ln>
-            <a:noFill/>
-          </a:ln>
-          <a:effectLst>
-            <a:outerShdw blurRad="76200" dist="88900" dir="6420000" sx="90000" sy="90000" kx="-1200000" algn="bl" rotWithShape="0">
-              <a:srgbClr val="000000">
-                <a:alpha val="27843"/>
-              </a:srgbClr>
-            </a:outerShdw>
-          </a:effectLst>
-        </p:spPr>
-        <p:txBody>
-          <a:bodyPr spcFirstLastPara="1" wrap="square" lIns="91425" tIns="45700" rIns="91425" bIns="45700" anchor="ctr" anchorCtr="0">
-            <a:noAutofit/>
-          </a:bodyPr>
-          <a:lstStyle/>
-          <a:p>
-            <a:pPr marL="0" marR="0" lvl="0" indent="0" algn="ctr" rtl="0">
-              <a:spcBef>
-                <a:spcPts val="0"/>
-              </a:spcBef>
-              <a:spcAft>
-                <a:spcPts val="0"/>
-              </a:spcAft>
-              <a:buNone/>
-            </a:pPr>
-            <a:endParaRPr sz="1350">
-              <a:solidFill>
-                <a:schemeClr val="lt1"/>
-              </a:solidFill>
-              <a:latin typeface="Arial"/>
-              <a:ea typeface="Arial"/>
-              <a:cs typeface="Arial"/>
-              <a:sym typeface="Arial"/>
-            </a:endParaRPr>
-          </a:p>
-        </p:txBody>
-      </p:sp>
-      <p:sp>
-        <p:nvSpPr>
-          <p:cNvPr id="505" name="Google Shape;505;p11"/>
-          <p:cNvSpPr/>
-          <p:nvPr/>
-        </p:nvSpPr>
-        <p:spPr>
-          <a:xfrm>
-            <a:off x="3390634" y="2718208"/>
-            <a:ext cx="68661" cy="68661"/>
-          </a:xfrm>
-          <a:prstGeom prst="ellipse">
-            <a:avLst/>
-          </a:prstGeom>
-          <a:solidFill>
-            <a:schemeClr val="lt1"/>
-          </a:solidFill>
-          <a:ln>
-            <a:noFill/>
-          </a:ln>
-          <a:effectLst>
-            <a:outerShdw blurRad="76200" dist="88900" dir="6420000" sx="90000" sy="90000" kx="-1200000" algn="bl" rotWithShape="0">
-              <a:srgbClr val="000000">
-                <a:alpha val="27843"/>
-              </a:srgbClr>
-            </a:outerShdw>
-          </a:effectLst>
-        </p:spPr>
-        <p:txBody>
-          <a:bodyPr spcFirstLastPara="1" wrap="square" lIns="91425" tIns="45700" rIns="91425" bIns="45700" anchor="ctr" anchorCtr="0">
-            <a:noAutofit/>
-          </a:bodyPr>
-          <a:lstStyle/>
-          <a:p>
-            <a:pPr marL="0" marR="0" lvl="0" indent="0" algn="ctr" rtl="0">
-              <a:spcBef>
-                <a:spcPts val="0"/>
-              </a:spcBef>
-              <a:spcAft>
-                <a:spcPts val="0"/>
-              </a:spcAft>
-              <a:buNone/>
-            </a:pPr>
-            <a:endParaRPr sz="1350">
-              <a:solidFill>
-                <a:schemeClr val="lt1"/>
-              </a:solidFill>
-              <a:latin typeface="Arial"/>
-              <a:ea typeface="Arial"/>
-              <a:cs typeface="Arial"/>
-              <a:sym typeface="Arial"/>
-            </a:endParaRPr>
-          </a:p>
-        </p:txBody>
-      </p:sp>
-      <p:sp>
-        <p:nvSpPr>
-          <p:cNvPr id="506" name="Google Shape;506;p11"/>
-          <p:cNvSpPr/>
-          <p:nvPr/>
-        </p:nvSpPr>
-        <p:spPr>
-          <a:xfrm>
-            <a:off x="4533932" y="4397599"/>
-            <a:ext cx="68661" cy="68661"/>
-          </a:xfrm>
-          <a:prstGeom prst="ellipse">
-            <a:avLst/>
-          </a:prstGeom>
-          <a:solidFill>
-            <a:schemeClr val="lt1"/>
-          </a:solidFill>
-          <a:ln>
-            <a:noFill/>
-          </a:ln>
-          <a:effectLst>
-            <a:outerShdw blurRad="76200" dist="88900" dir="6420000" sx="90000" sy="90000" kx="-1200000" algn="bl" rotWithShape="0">
-              <a:srgbClr val="000000">
-                <a:alpha val="27843"/>
-              </a:srgbClr>
-            </a:outerShdw>
-          </a:effectLst>
-        </p:spPr>
-        <p:txBody>
-          <a:bodyPr spcFirstLastPara="1" wrap="square" lIns="91425" tIns="45700" rIns="91425" bIns="45700" anchor="ctr" anchorCtr="0">
-            <a:noAutofit/>
-          </a:bodyPr>
-          <a:lstStyle/>
-          <a:p>
-            <a:pPr marL="0" marR="0" lvl="0" indent="0" algn="ctr" rtl="0">
-              <a:spcBef>
-                <a:spcPts val="0"/>
-              </a:spcBef>
-              <a:spcAft>
-                <a:spcPts val="0"/>
-              </a:spcAft>
-              <a:buNone/>
-            </a:pPr>
-            <a:endParaRPr sz="1350">
-              <a:solidFill>
-                <a:schemeClr val="lt1"/>
-              </a:solidFill>
-              <a:latin typeface="Arial"/>
-              <a:ea typeface="Arial"/>
-              <a:cs typeface="Arial"/>
-              <a:sym typeface="Arial"/>
-            </a:endParaRPr>
-          </a:p>
-        </p:txBody>
-      </p:sp>
-      <p:sp>
-        <p:nvSpPr>
-          <p:cNvPr id="507" name="Google Shape;507;p11"/>
-          <p:cNvSpPr/>
-          <p:nvPr/>
-        </p:nvSpPr>
-        <p:spPr>
-          <a:xfrm>
-            <a:off x="4569414" y="2272173"/>
-            <a:ext cx="68661" cy="68661"/>
-          </a:xfrm>
-          <a:prstGeom prst="ellipse">
-            <a:avLst/>
-          </a:prstGeom>
-          <a:solidFill>
-            <a:schemeClr val="lt1"/>
-          </a:solidFill>
-          <a:ln>
-            <a:noFill/>
-          </a:ln>
-          <a:effectLst>
-            <a:outerShdw blurRad="76200" dist="88900" dir="6420000" sx="90000" sy="90000" kx="-1200000" algn="bl" rotWithShape="0">
-              <a:srgbClr val="000000">
-                <a:alpha val="27843"/>
-              </a:srgbClr>
-            </a:outerShdw>
-          </a:effectLst>
-        </p:spPr>
-        <p:txBody>
-          <a:bodyPr spcFirstLastPara="1" wrap="square" lIns="91425" tIns="45700" rIns="91425" bIns="45700" anchor="ctr" anchorCtr="0">
-            <a:noAutofit/>
-          </a:bodyPr>
-          <a:lstStyle/>
-          <a:p>
-            <a:pPr marL="0" marR="0" lvl="0" indent="0" algn="ctr" rtl="0">
-              <a:spcBef>
-                <a:spcPts val="0"/>
-              </a:spcBef>
-              <a:spcAft>
-                <a:spcPts val="0"/>
-              </a:spcAft>
-              <a:buNone/>
-            </a:pPr>
-            <a:endParaRPr sz="1350">
-              <a:solidFill>
-                <a:schemeClr val="lt1"/>
-              </a:solidFill>
-              <a:latin typeface="Arial"/>
-              <a:ea typeface="Arial"/>
-              <a:cs typeface="Arial"/>
-              <a:sym typeface="Arial"/>
-            </a:endParaRPr>
-          </a:p>
-        </p:txBody>
-      </p:sp>
-      <p:sp>
-        <p:nvSpPr>
-          <p:cNvPr id="508" name="Google Shape;508;p11"/>
-          <p:cNvSpPr/>
-          <p:nvPr/>
-        </p:nvSpPr>
-        <p:spPr>
-          <a:xfrm>
-            <a:off x="7106241" y="2272173"/>
-            <a:ext cx="68661" cy="68661"/>
-          </a:xfrm>
-          <a:prstGeom prst="ellipse">
-            <a:avLst/>
-          </a:prstGeom>
-          <a:solidFill>
-            <a:schemeClr val="lt1"/>
-          </a:solidFill>
-          <a:ln>
-            <a:noFill/>
-          </a:ln>
-          <a:effectLst>
-            <a:outerShdw blurRad="76200" dist="88900" dir="6420000" sx="90000" sy="90000" kx="-1200000" algn="bl" rotWithShape="0">
-              <a:srgbClr val="000000">
-                <a:alpha val="27843"/>
-              </a:srgbClr>
-            </a:outerShdw>
-          </a:effectLst>
-        </p:spPr>
-        <p:txBody>
-          <a:bodyPr spcFirstLastPara="1" wrap="square" lIns="91425" tIns="45700" rIns="91425" bIns="45700" anchor="ctr" anchorCtr="0">
-            <a:noAutofit/>
-          </a:bodyPr>
-          <a:lstStyle/>
-          <a:p>
-            <a:pPr marL="0" marR="0" lvl="0" indent="0" algn="ctr" rtl="0">
-              <a:spcBef>
-                <a:spcPts val="0"/>
-              </a:spcBef>
-              <a:spcAft>
-                <a:spcPts val="0"/>
-              </a:spcAft>
-              <a:buNone/>
-            </a:pPr>
-            <a:endParaRPr sz="1350">
-              <a:solidFill>
-                <a:schemeClr val="lt1"/>
-              </a:solidFill>
-              <a:latin typeface="Arial"/>
-              <a:ea typeface="Arial"/>
-              <a:cs typeface="Arial"/>
-              <a:sym typeface="Arial"/>
-            </a:endParaRPr>
-          </a:p>
-        </p:txBody>
-      </p:sp>
-      <p:sp>
-        <p:nvSpPr>
-          <p:cNvPr id="509" name="Google Shape;509;p11"/>
-          <p:cNvSpPr/>
-          <p:nvPr/>
-        </p:nvSpPr>
-        <p:spPr>
-          <a:xfrm>
-            <a:off x="7202733" y="4397599"/>
-            <a:ext cx="68661" cy="68661"/>
-          </a:xfrm>
-          <a:prstGeom prst="ellipse">
-            <a:avLst/>
-          </a:prstGeom>
-          <a:solidFill>
-            <a:schemeClr val="lt1"/>
-          </a:solidFill>
-          <a:ln>
-            <a:noFill/>
-          </a:ln>
-          <a:effectLst>
-            <a:outerShdw blurRad="76200" dist="88900" dir="6420000" sx="90000" sy="90000" kx="-1200000" algn="bl" rotWithShape="0">
-              <a:srgbClr val="000000">
-                <a:alpha val="27843"/>
-              </a:srgbClr>
-            </a:outerShdw>
-          </a:effectLst>
-        </p:spPr>
-        <p:txBody>
-          <a:bodyPr spcFirstLastPara="1" wrap="square" lIns="91425" tIns="45700" rIns="91425" bIns="45700" anchor="ctr" anchorCtr="0">
-            <a:noAutofit/>
-          </a:bodyPr>
-          <a:lstStyle/>
-          <a:p>
-            <a:pPr marL="0" marR="0" lvl="0" indent="0" algn="ctr" rtl="0">
-              <a:spcBef>
-                <a:spcPts val="0"/>
-              </a:spcBef>
-              <a:spcAft>
-                <a:spcPts val="0"/>
-              </a:spcAft>
-              <a:buNone/>
-            </a:pPr>
-            <a:endParaRPr sz="1350">
-              <a:solidFill>
-                <a:schemeClr val="lt1"/>
-              </a:solidFill>
-              <a:latin typeface="Arial"/>
-              <a:ea typeface="Arial"/>
-              <a:cs typeface="Arial"/>
-              <a:sym typeface="Arial"/>
-            </a:endParaRPr>
-          </a:p>
-        </p:txBody>
-      </p:sp>
-      <p:sp>
-        <p:nvSpPr>
-          <p:cNvPr id="510" name="Google Shape;510;p11"/>
-          <p:cNvSpPr/>
-          <p:nvPr/>
-        </p:nvSpPr>
-        <p:spPr>
-          <a:xfrm>
-            <a:off x="8304736" y="3937726"/>
-            <a:ext cx="68661" cy="68661"/>
-          </a:xfrm>
-          <a:prstGeom prst="ellipse">
-            <a:avLst/>
-          </a:prstGeom>
-          <a:solidFill>
-            <a:schemeClr val="lt1"/>
-          </a:solidFill>
-          <a:ln>
-            <a:noFill/>
-          </a:ln>
-          <a:effectLst>
-            <a:outerShdw blurRad="76200" dist="88900" dir="6420000" sx="90000" sy="90000" kx="-1200000" algn="bl" rotWithShape="0">
-              <a:srgbClr val="000000">
-                <a:alpha val="27843"/>
-              </a:srgbClr>
-            </a:outerShdw>
-          </a:effectLst>
-        </p:spPr>
-        <p:txBody>
-          <a:bodyPr spcFirstLastPara="1" wrap="square" lIns="91425" tIns="45700" rIns="91425" bIns="45700" anchor="ctr" anchorCtr="0">
-            <a:noAutofit/>
-          </a:bodyPr>
-          <a:lstStyle/>
-          <a:p>
-            <a:pPr marL="0" marR="0" lvl="0" indent="0" algn="ctr" rtl="0">
-              <a:spcBef>
-                <a:spcPts val="0"/>
-              </a:spcBef>
-              <a:spcAft>
-                <a:spcPts val="0"/>
-              </a:spcAft>
-              <a:buNone/>
-            </a:pPr>
-            <a:endParaRPr sz="1350">
-              <a:solidFill>
-                <a:schemeClr val="lt1"/>
-              </a:solidFill>
-              <a:latin typeface="Arial"/>
-              <a:ea typeface="Arial"/>
-              <a:cs typeface="Arial"/>
-              <a:sym typeface="Arial"/>
-            </a:endParaRPr>
-          </a:p>
-        </p:txBody>
-      </p:sp>
-      <p:sp>
-        <p:nvSpPr>
-          <p:cNvPr id="511" name="Google Shape;511;p11"/>
-          <p:cNvSpPr/>
-          <p:nvPr/>
-        </p:nvSpPr>
-        <p:spPr>
-          <a:xfrm>
-            <a:off x="8298500" y="2718208"/>
-            <a:ext cx="68661" cy="68661"/>
-          </a:xfrm>
-          <a:prstGeom prst="ellipse">
-            <a:avLst/>
-          </a:prstGeom>
-          <a:solidFill>
-            <a:schemeClr val="lt1"/>
-          </a:solidFill>
-          <a:ln>
-            <a:noFill/>
-          </a:ln>
-          <a:effectLst>
-            <a:outerShdw blurRad="76200" dist="88900" dir="6420000" sx="90000" sy="90000" kx="-1200000" algn="bl" rotWithShape="0">
-              <a:srgbClr val="000000">
-                <a:alpha val="27843"/>
-              </a:srgbClr>
-            </a:outerShdw>
-          </a:effectLst>
-        </p:spPr>
-        <p:txBody>
-          <a:bodyPr spcFirstLastPara="1" wrap="square" lIns="91425" tIns="45700" rIns="91425" bIns="45700" anchor="ctr" anchorCtr="0">
-            <a:noAutofit/>
-          </a:bodyPr>
-          <a:lstStyle/>
-          <a:p>
-            <a:pPr marL="0" marR="0" lvl="0" indent="0" algn="ctr" rtl="0">
-              <a:spcBef>
-                <a:spcPts val="0"/>
-              </a:spcBef>
-              <a:spcAft>
-                <a:spcPts val="0"/>
-              </a:spcAft>
-              <a:buNone/>
-            </a:pPr>
-            <a:endParaRPr sz="1350">
-              <a:solidFill>
-                <a:schemeClr val="lt1"/>
-              </a:solidFill>
-              <a:latin typeface="Arial"/>
-              <a:ea typeface="Arial"/>
-              <a:cs typeface="Arial"/>
-              <a:sym typeface="Arial"/>
-            </a:endParaRPr>
-          </a:p>
-        </p:txBody>
-      </p:sp>
-      <p:sp>
-        <p:nvSpPr>
           <p:cNvPr id="512" name="Google Shape;512;p11"/>
           <p:cNvSpPr/>
           <p:nvPr/>
         </p:nvSpPr>
         <p:spPr>
           <a:xfrm>
-            <a:off x="6628387" y="2928271"/>
-            <a:ext cx="1595324" cy="467051"/>
+            <a:off x="6628386" y="2928271"/>
+            <a:ext cx="1670113" cy="904823"/>
           </a:xfrm>
           <a:prstGeom prst="rect">
             <a:avLst/>
@@ -11623,7 +11112,7 @@
               <a:buNone/>
             </a:pPr>
             <a:r>
-              <a:rPr lang="en-US" sz="2400">
+              <a:rPr lang="en-US" sz="2400" dirty="0">
                 <a:solidFill>
                   <a:schemeClr val="accent1"/>
                 </a:solidFill>
@@ -11632,9 +11121,32 @@
                 <a:cs typeface="Arial"/>
                 <a:sym typeface="Arial"/>
               </a:rPr>
-              <a:t>Technical</a:t>
+              <a:t>Technical </a:t>
             </a:r>
-            <a:endParaRPr sz="1800">
+            <a:br>
+              <a:rPr lang="en-US" sz="2400" dirty="0">
+                <a:solidFill>
+                  <a:schemeClr val="accent1"/>
+                </a:solidFill>
+                <a:latin typeface="Arial"/>
+                <a:ea typeface="Arial"/>
+                <a:cs typeface="Arial"/>
+                <a:sym typeface="Arial"/>
+              </a:rPr>
+            </a:br>
+            <a:r>
+              <a:rPr lang="en-US" sz="2400" dirty="0">
+                <a:solidFill>
+                  <a:schemeClr val="accent1"/>
+                </a:solidFill>
+                <a:latin typeface="Arial"/>
+                <a:ea typeface="Arial"/>
+                <a:cs typeface="Arial"/>
+                <a:sym typeface="Arial"/>
+              </a:rPr>
+              <a:t>Workstream</a:t>
+            </a:r>
+            <a:endParaRPr sz="1800" dirty="0">
               <a:solidFill>
                 <a:schemeClr val="accent1"/>
               </a:solidFill>
@@ -11655,7 +11167,7 @@
         <p:spPr>
           <a:xfrm>
             <a:off x="3230992" y="2894544"/>
-            <a:ext cx="2228197" cy="847091"/>
+            <a:ext cx="2228197" cy="972534"/>
           </a:xfrm>
           <a:prstGeom prst="rect">
             <a:avLst/>
@@ -11684,7 +11196,7 @@
               <a:buNone/>
             </a:pPr>
             <a:r>
-              <a:rPr lang="en-US" sz="2400">
+              <a:rPr lang="en-US" sz="2400" dirty="0">
                 <a:solidFill>
                   <a:schemeClr val="accent1"/>
                 </a:solidFill>
@@ -11696,7 +11208,7 @@
               <a:t>Terminology</a:t>
             </a:r>
             <a:r>
-              <a:rPr lang="en-US" sz="2800">
+              <a:rPr lang="en-US" sz="2800" dirty="0">
                 <a:solidFill>
                   <a:schemeClr val="accent1"/>
                 </a:solidFill>
@@ -11708,7 +11220,7 @@
               <a:t> </a:t>
             </a:r>
             <a:r>
-              <a:rPr lang="en-US" sz="1800">
+              <a:rPr lang="en-US" sz="2400" dirty="0">
                 <a:solidFill>
                   <a:schemeClr val="accent1"/>
                 </a:solidFill>
@@ -11717,9 +11229,9 @@
                 <a:cs typeface="Arial"/>
                 <a:sym typeface="Arial"/>
               </a:rPr>
-              <a:t>(SDOH Domains)</a:t>
+              <a:t>Workstream</a:t>
             </a:r>
-            <a:endParaRPr/>
+            <a:endParaRPr dirty="0"/>
           </a:p>
         </p:txBody>
       </p:sp>
@@ -12178,13 +11690,13 @@
       </p:sp>
       <p:sp>
         <p:nvSpPr>
-          <p:cNvPr id="523" name="Google Shape;523;p11"/>
+          <p:cNvPr id="528" name="Google Shape;528;p11"/>
           <p:cNvSpPr/>
           <p:nvPr/>
         </p:nvSpPr>
         <p:spPr>
           <a:xfrm>
-            <a:off x="4353422" y="4272757"/>
+            <a:off x="4145222" y="2413258"/>
             <a:ext cx="350683" cy="348551"/>
           </a:xfrm>
           <a:prstGeom prst="ellipse">
@@ -12222,7 +11734,7 @@
                 <a:cs typeface="Arial"/>
                 <a:sym typeface="Arial"/>
               </a:rPr>
-              <a:t>4</a:t>
+              <a:t>1</a:t>
             </a:r>
             <a:endParaRPr/>
           </a:p>
@@ -12230,13 +11742,13 @@
       </p:sp>
       <p:sp>
         <p:nvSpPr>
-          <p:cNvPr id="524" name="Google Shape;524;p11"/>
+          <p:cNvPr id="529" name="Google Shape;529;p11"/>
           <p:cNvSpPr/>
           <p:nvPr/>
         </p:nvSpPr>
         <p:spPr>
           <a:xfrm>
-            <a:off x="3302788" y="3831676"/>
+            <a:off x="7224535" y="2422500"/>
             <a:ext cx="350683" cy="348551"/>
           </a:xfrm>
           <a:prstGeom prst="ellipse">
@@ -12274,266 +11786,6 @@
                 <a:cs typeface="Arial"/>
                 <a:sym typeface="Arial"/>
               </a:rPr>
-              <a:t>1</a:t>
-            </a:r>
-            <a:endParaRPr/>
-          </a:p>
-        </p:txBody>
-      </p:sp>
-      <p:sp>
-        <p:nvSpPr>
-          <p:cNvPr id="525" name="Google Shape;525;p11"/>
-          <p:cNvSpPr/>
-          <p:nvPr/>
-        </p:nvSpPr>
-        <p:spPr>
-          <a:xfrm>
-            <a:off x="3302788" y="2555326"/>
-            <a:ext cx="350683" cy="348551"/>
-          </a:xfrm>
-          <a:prstGeom prst="ellipse">
-            <a:avLst/>
-          </a:prstGeom>
-          <a:solidFill>
-            <a:schemeClr val="accent1"/>
-          </a:solidFill>
-          <a:ln>
-            <a:noFill/>
-          </a:ln>
-        </p:spPr>
-        <p:txBody>
-          <a:bodyPr spcFirstLastPara="1" wrap="square" lIns="91425" tIns="45700" rIns="91425" bIns="45700" anchor="ctr" anchorCtr="0">
-            <a:noAutofit/>
-          </a:bodyPr>
-          <a:lstStyle/>
-          <a:p>
-            <a:pPr marL="0" marR="0" lvl="0" indent="0" algn="ctr" rtl="0">
-              <a:spcBef>
-                <a:spcPts val="0"/>
-              </a:spcBef>
-              <a:spcAft>
-                <a:spcPts val="0"/>
-              </a:spcAft>
-              <a:buNone/>
-            </a:pPr>
-            <a:r>
-              <a:rPr lang="en-US" sz="1400">
-                <a:solidFill>
-                  <a:schemeClr val="lt1"/>
-                </a:solidFill>
-                <a:latin typeface="Arial"/>
-                <a:ea typeface="Arial"/>
-                <a:cs typeface="Arial"/>
-                <a:sym typeface="Arial"/>
-              </a:rPr>
-              <a:t>2</a:t>
-            </a:r>
-            <a:endParaRPr/>
-          </a:p>
-        </p:txBody>
-      </p:sp>
-      <p:sp>
-        <p:nvSpPr>
-          <p:cNvPr id="526" name="Google Shape;526;p11"/>
-          <p:cNvSpPr/>
-          <p:nvPr/>
-        </p:nvSpPr>
-        <p:spPr>
-          <a:xfrm>
-            <a:off x="4438144" y="2153466"/>
-            <a:ext cx="350683" cy="348551"/>
-          </a:xfrm>
-          <a:prstGeom prst="ellipse">
-            <a:avLst/>
-          </a:prstGeom>
-          <a:solidFill>
-            <a:schemeClr val="accent1"/>
-          </a:solidFill>
-          <a:ln>
-            <a:noFill/>
-          </a:ln>
-        </p:spPr>
-        <p:txBody>
-          <a:bodyPr spcFirstLastPara="1" wrap="square" lIns="91425" tIns="45700" rIns="91425" bIns="45700" anchor="ctr" anchorCtr="0">
-            <a:noAutofit/>
-          </a:bodyPr>
-          <a:lstStyle/>
-          <a:p>
-            <a:pPr marL="0" marR="0" lvl="0" indent="0" algn="ctr" rtl="0">
-              <a:spcBef>
-                <a:spcPts val="0"/>
-              </a:spcBef>
-              <a:spcAft>
-                <a:spcPts val="0"/>
-              </a:spcAft>
-              <a:buNone/>
-            </a:pPr>
-            <a:r>
-              <a:rPr lang="en-US" sz="1400">
-                <a:solidFill>
-                  <a:schemeClr val="lt1"/>
-                </a:solidFill>
-                <a:latin typeface="Arial"/>
-                <a:ea typeface="Arial"/>
-                <a:cs typeface="Arial"/>
-                <a:sym typeface="Arial"/>
-              </a:rPr>
-              <a:t>3</a:t>
-            </a:r>
-            <a:endParaRPr/>
-          </a:p>
-        </p:txBody>
-      </p:sp>
-      <p:sp>
-        <p:nvSpPr>
-          <p:cNvPr id="527" name="Google Shape;527;p11"/>
-          <p:cNvSpPr/>
-          <p:nvPr/>
-        </p:nvSpPr>
-        <p:spPr>
-          <a:xfrm>
-            <a:off x="7113862" y="4305468"/>
-            <a:ext cx="350683" cy="348551"/>
-          </a:xfrm>
-          <a:prstGeom prst="ellipse">
-            <a:avLst/>
-          </a:prstGeom>
-          <a:solidFill>
-            <a:schemeClr val="accent1"/>
-          </a:solidFill>
-          <a:ln>
-            <a:noFill/>
-          </a:ln>
-        </p:spPr>
-        <p:txBody>
-          <a:bodyPr spcFirstLastPara="1" wrap="square" lIns="91425" tIns="45700" rIns="91425" bIns="45700" anchor="ctr" anchorCtr="0">
-            <a:noAutofit/>
-          </a:bodyPr>
-          <a:lstStyle/>
-          <a:p>
-            <a:pPr marL="0" marR="0" lvl="0" indent="0" algn="ctr" rtl="0">
-              <a:spcBef>
-                <a:spcPts val="0"/>
-              </a:spcBef>
-              <a:spcAft>
-                <a:spcPts val="0"/>
-              </a:spcAft>
-              <a:buNone/>
-            </a:pPr>
-            <a:r>
-              <a:rPr lang="en-US" sz="1400">
-                <a:solidFill>
-                  <a:schemeClr val="lt1"/>
-                </a:solidFill>
-                <a:latin typeface="Arial"/>
-                <a:ea typeface="Arial"/>
-                <a:cs typeface="Arial"/>
-                <a:sym typeface="Arial"/>
-              </a:rPr>
-              <a:t>4</a:t>
-            </a:r>
-            <a:endParaRPr/>
-          </a:p>
-        </p:txBody>
-      </p:sp>
-      <p:sp>
-        <p:nvSpPr>
-          <p:cNvPr id="528" name="Google Shape;528;p11"/>
-          <p:cNvSpPr/>
-          <p:nvPr/>
-        </p:nvSpPr>
-        <p:spPr>
-          <a:xfrm>
-            <a:off x="8165193" y="3865349"/>
-            <a:ext cx="350683" cy="348551"/>
-          </a:xfrm>
-          <a:prstGeom prst="ellipse">
-            <a:avLst/>
-          </a:prstGeom>
-          <a:solidFill>
-            <a:schemeClr val="accent1"/>
-          </a:solidFill>
-          <a:ln>
-            <a:noFill/>
-          </a:ln>
-        </p:spPr>
-        <p:txBody>
-          <a:bodyPr spcFirstLastPara="1" wrap="square" lIns="91425" tIns="45700" rIns="91425" bIns="45700" anchor="ctr" anchorCtr="0">
-            <a:noAutofit/>
-          </a:bodyPr>
-          <a:lstStyle/>
-          <a:p>
-            <a:pPr marL="0" marR="0" lvl="0" indent="0" algn="ctr" rtl="0">
-              <a:spcBef>
-                <a:spcPts val="0"/>
-              </a:spcBef>
-              <a:spcAft>
-                <a:spcPts val="0"/>
-              </a:spcAft>
-              <a:buNone/>
-            </a:pPr>
-            <a:r>
-              <a:rPr lang="en-US" sz="1400">
-                <a:solidFill>
-                  <a:schemeClr val="lt1"/>
-                </a:solidFill>
-                <a:latin typeface="Arial"/>
-                <a:ea typeface="Arial"/>
-                <a:cs typeface="Arial"/>
-                <a:sym typeface="Arial"/>
-              </a:rPr>
-              <a:t>1</a:t>
-            </a:r>
-            <a:endParaRPr/>
-          </a:p>
-        </p:txBody>
-      </p:sp>
-      <p:sp>
-        <p:nvSpPr>
-          <p:cNvPr id="529" name="Google Shape;529;p11"/>
-          <p:cNvSpPr/>
-          <p:nvPr/>
-        </p:nvSpPr>
-        <p:spPr>
-          <a:xfrm>
-            <a:off x="8165193" y="2631006"/>
-            <a:ext cx="350683" cy="348551"/>
-          </a:xfrm>
-          <a:prstGeom prst="ellipse">
-            <a:avLst/>
-          </a:prstGeom>
-          <a:solidFill>
-            <a:schemeClr val="accent1"/>
-          </a:solidFill>
-          <a:ln>
-            <a:noFill/>
-          </a:ln>
-        </p:spPr>
-        <p:txBody>
-          <a:bodyPr spcFirstLastPara="1" wrap="square" lIns="91425" tIns="45700" rIns="91425" bIns="45700" anchor="ctr" anchorCtr="0">
-            <a:noAutofit/>
-          </a:bodyPr>
-          <a:lstStyle/>
-          <a:p>
-            <a:pPr marL="0" marR="0" lvl="0" indent="0" algn="ctr" rtl="0">
-              <a:spcBef>
-                <a:spcPts val="0"/>
-              </a:spcBef>
-              <a:spcAft>
-                <a:spcPts val="0"/>
-              </a:spcAft>
-              <a:buNone/>
-            </a:pPr>
-            <a:r>
-              <a:rPr lang="en-US" sz="1400">
-                <a:solidFill>
-                  <a:schemeClr val="lt1"/>
-                </a:solidFill>
-                <a:latin typeface="Arial"/>
-                <a:ea typeface="Arial"/>
-                <a:cs typeface="Arial"/>
-                <a:sym typeface="Arial"/>
-              </a:rPr>
               <a:t>2</a:t>
             </a:r>
             <a:endParaRPr/>
@@ -12548,7 +11800,7 @@
         </p:nvSpPr>
         <p:spPr>
           <a:xfrm>
-            <a:off x="6997450" y="2153466"/>
+            <a:off x="7703085" y="5892360"/>
             <a:ext cx="350683" cy="348551"/>
           </a:xfrm>
           <a:prstGeom prst="ellipse">
@@ -12651,19 +11903,21 @@
         </p:nvSpPr>
         <p:spPr>
           <a:xfrm>
-            <a:off x="2718179" y="5762598"/>
-            <a:ext cx="6755642" cy="384187"/>
+            <a:off x="2718178" y="5762598"/>
+            <a:ext cx="6836129" cy="608077"/>
           </a:xfrm>
           <a:prstGeom prst="roundRect">
             <a:avLst>
               <a:gd name="adj" fmla="val 100000"/>
             </a:avLst>
           </a:prstGeom>
-          <a:solidFill>
-            <a:srgbClr val="C95725"/>
-          </a:solidFill>
-          <a:ln>
-            <a:noFill/>
+          <a:noFill/>
+          <a:ln w="117475">
+            <a:solidFill>
+              <a:schemeClr val="tx2">
+                <a:lumMod val="90000"/>
+              </a:schemeClr>
+            </a:solidFill>
           </a:ln>
         </p:spPr>
         <p:txBody>
@@ -12674,7 +11928,7 @@
           <a:p>
             <a:pPr marL="0" marR="0" lvl="0" indent="0" algn="ctr" rtl="0">
               <a:lnSpc>
-                <a:spcPct val="100000"/>
+                <a:spcPct val="110000"/>
               </a:lnSpc>
               <a:spcBef>
                 <a:spcPts val="0"/>
@@ -12682,21 +11936,28 @@
               <a:spcAft>
                 <a:spcPts val="0"/>
               </a:spcAft>
-              <a:buClr>
-                <a:schemeClr val="dk1"/>
-              </a:buClr>
-              <a:buSzPts val="1000"/>
-              <a:buFont typeface="Arial"/>
               <a:buNone/>
             </a:pPr>
-            <a:endParaRPr sz="1000" b="1" i="0" u="none" strike="noStrike" cap="none">
+            <a:r>
+              <a:rPr lang="en-US" sz="2400" dirty="0">
+                <a:solidFill>
+                  <a:schemeClr val="accent1"/>
+                </a:solidFill>
+                <a:latin typeface="Arial"/>
+                <a:ea typeface="Arial"/>
+                <a:cs typeface="Arial"/>
+                <a:sym typeface="Arial"/>
+              </a:rPr>
+              <a:t>Technical Workstream</a:t>
+            </a:r>
+            <a:endParaRPr lang="en-US" sz="1800" dirty="0">
               <a:solidFill>
-                <a:srgbClr val="FFFFFF"/>
+                <a:schemeClr val="accent1"/>
               </a:solidFill>
-              <a:latin typeface="Calibri"/>
-              <a:ea typeface="Calibri"/>
-              <a:cs typeface="Calibri"/>
-              <a:sym typeface="Calibri"/>
+              <a:latin typeface="Arial"/>
+              <a:ea typeface="Arial"/>
+              <a:cs typeface="Arial"/>
+              <a:sym typeface="Arial"/>
             </a:endParaRPr>
           </a:p>
         </p:txBody>
@@ -12709,7 +11970,7 @@
         </p:nvSpPr>
         <p:spPr>
           <a:xfrm>
-            <a:off x="2847832" y="5778291"/>
+            <a:off x="6522935" y="6514570"/>
             <a:ext cx="6496335" cy="369332"/>
           </a:xfrm>
           <a:prstGeom prst="rect">
@@ -12769,7 +12030,9 @@
             </a:avLst>
           </a:prstGeom>
           <a:solidFill>
-            <a:srgbClr val="C43A28"/>
+            <a:schemeClr val="tx2">
+              <a:lumMod val="50000"/>
+            </a:schemeClr>
           </a:solidFill>
           <a:ln>
             <a:noFill/>
@@ -12820,7 +12083,9 @@
             </a:avLst>
           </a:prstGeom>
           <a:solidFill>
-            <a:srgbClr val="C43A28"/>
+            <a:schemeClr val="tx2">
+              <a:lumMod val="50000"/>
+            </a:schemeClr>
           </a:solidFill>
           <a:ln>
             <a:noFill/>
@@ -12868,7 +12133,7 @@
         </p:blipFill>
         <p:spPr>
           <a:xfrm>
-            <a:off x="6846097" y="3411015"/>
+            <a:off x="6799094" y="3727541"/>
             <a:ext cx="1156891" cy="410589"/>
           </a:xfrm>
           <a:prstGeom prst="rect">

</xml_diff>

<commit_message>
added CPT and HCPCS
</commit_message>
<xml_diff>
--- a/Images Source/GravitySlides.pptx
+++ b/Images Source/GravitySlides.pptx
@@ -20,11 +20,18 @@
       <p:bold r:id="rId6"/>
     </p:embeddedFont>
     <p:embeddedFont>
-      <p:font typeface="Calibri" panose="020F0502020204030204" pitchFamily="34" charset="0"/>
+      <p:font typeface="Bookman Old Style" panose="02050604050505020204" pitchFamily="18" charset="0"/>
       <p:regular r:id="rId7"/>
       <p:bold r:id="rId8"/>
       <p:italic r:id="rId9"/>
       <p:boldItalic r:id="rId10"/>
+    </p:embeddedFont>
+    <p:embeddedFont>
+      <p:font typeface="Calibri" panose="020F0502020204030204" pitchFamily="34" charset="0"/>
+      <p:regular r:id="rId11"/>
+      <p:bold r:id="rId12"/>
+      <p:italic r:id="rId13"/>
+      <p:boldItalic r:id="rId14"/>
     </p:embeddedFont>
   </p:embeddedFontLst>
   <p:defaultTextStyle>
@@ -261,7 +268,7 @@
       <p15:sldGuideLst xmlns:p15="http://schemas.microsoft.com/office/powerpoint/2012/main"/>
     </p:ext>
     <p:ext uri="http://customooxmlschemas.google.com/">
-      <go:slidesCustomData xmlns="" xmlns:mc="http://schemas.openxmlformats.org/markup-compatibility/2006" xmlns:mv="urn:schemas-microsoft-com:mac:vml" xmlns:c="http://schemas.openxmlformats.org/drawingml/2006/chart" xmlns:dgm="http://schemas.openxmlformats.org/drawingml/2006/diagram" xmlns:o="urn:schemas-microsoft-com:office:office" xmlns:v="urn:schemas-microsoft-com:vml" xmlns:pvml="urn:schemas-microsoft-com:office:powerpoint" xmlns:com="http://schemas.openxmlformats.org/drawingml/2006/compatibility" xmlns:p14="http://schemas.microsoft.com/office/powerpoint/2010/main" xmlns:p15="http://schemas.microsoft.com/office/powerpoint/2012/main" xmlns:ahyp="http://schemas.microsoft.com/office/drawing/2018/hyperlinkcolor" xmlns:go="http://customooxmlschemas.google.com/" r:id="rId44" roundtripDataSignature="AMtx7mhurd1H7GBQRbcnBHxCnCHdMa4/Ag=="/>
+      <go:slidesCustomData xmlns:go="http://customooxmlschemas.google.com/" xmlns:ahyp="http://schemas.microsoft.com/office/drawing/2018/hyperlinkcolor" xmlns:p15="http://schemas.microsoft.com/office/powerpoint/2012/main" xmlns:p14="http://schemas.microsoft.com/office/powerpoint/2010/main" xmlns:com="http://schemas.openxmlformats.org/drawingml/2006/compatibility" xmlns:pvml="urn:schemas-microsoft-com:office:powerpoint" xmlns:v="urn:schemas-microsoft-com:vml" xmlns:o="urn:schemas-microsoft-com:office:office" xmlns:dgm="http://schemas.openxmlformats.org/drawingml/2006/diagram" xmlns:c="http://schemas.openxmlformats.org/drawingml/2006/chart" xmlns:mv="urn:schemas-microsoft-com:mac:vml" xmlns:mc="http://schemas.openxmlformats.org/markup-compatibility/2006" xmlns="" r:id="rId44" roundtripDataSignature="AMtx7mhurd1H7GBQRbcnBHxCnCHdMa4/Ag=="/>
     </p:ext>
   </p:extLst>
 </p:presentation>
@@ -9947,7 +9954,7 @@
         </p:nvGrpSpPr>
         <p:grpSpPr>
           <a:xfrm>
-            <a:off x="149801" y="171214"/>
+            <a:off x="154121" y="181725"/>
             <a:ext cx="9919235" cy="5673760"/>
             <a:chOff x="149801" y="171214"/>
             <a:chExt cx="9919235" cy="5673760"/>
@@ -12052,7 +12059,7 @@
           </p:blipFill>
           <p:spPr>
             <a:xfrm>
-              <a:off x="891448" y="1952684"/>
+              <a:off x="1585793" y="1929480"/>
               <a:ext cx="758058" cy="208968"/>
             </a:xfrm>
             <a:prstGeom prst="rect">
@@ -12171,6 +12178,90 @@
           </p:txBody>
         </p:sp>
       </p:grpSp>
+      <p:pic>
+        <p:nvPicPr>
+          <p:cNvPr id="1026" name="Picture 2" descr="Office Evaluation and Management (E/M) CPT Code Revisions ...">
+            <a:extLst>
+              <a:ext uri="{FF2B5EF4-FFF2-40B4-BE49-F238E27FC236}">
+                <a16:creationId xmlns:a16="http://schemas.microsoft.com/office/drawing/2014/main" id="{0D6DDC1A-C496-1F83-ABD6-61251489DC20}"/>
+              </a:ext>
+            </a:extLst>
+          </p:cNvPr>
+          <p:cNvPicPr>
+            <a:picLocks noChangeAspect="1" noChangeArrowheads="1"/>
+          </p:cNvPicPr>
+          <p:nvPr/>
+        </p:nvPicPr>
+        <p:blipFill>
+          <a:blip r:embed="rId7">
+            <a:extLst>
+              <a:ext uri="{28A0092B-C50C-407E-A947-70E740481C1C}">
+                <a14:useLocalDpi xmlns:a14="http://schemas.microsoft.com/office/drawing/2010/main" val="0"/>
+              </a:ext>
+            </a:extLst>
+          </a:blip>
+          <a:srcRect/>
+          <a:stretch>
+            <a:fillRect/>
+          </a:stretch>
+        </p:blipFill>
+        <p:spPr bwMode="auto">
+          <a:xfrm>
+            <a:off x="154121" y="1938089"/>
+            <a:ext cx="608315" cy="304158"/>
+          </a:xfrm>
+          <a:prstGeom prst="rect">
+            <a:avLst/>
+          </a:prstGeom>
+          <a:noFill/>
+          <a:extLst>
+            <a:ext uri="{909E8E84-426E-40DD-AFC4-6F175D3DCCD1}">
+              <a14:hiddenFill xmlns:a14="http://schemas.microsoft.com/office/drawing/2010/main">
+                <a:solidFill>
+                  <a:srgbClr val="FFFFFF"/>
+                </a:solidFill>
+              </a14:hiddenFill>
+            </a:ext>
+          </a:extLst>
+        </p:spPr>
+      </p:pic>
+      <p:sp>
+        <p:nvSpPr>
+          <p:cNvPr id="3" name="TextBox 2">
+            <a:extLst>
+              <a:ext uri="{FF2B5EF4-FFF2-40B4-BE49-F238E27FC236}">
+                <a16:creationId xmlns:a16="http://schemas.microsoft.com/office/drawing/2014/main" id="{4267AD0E-4CEE-790E-CFEA-F6DF60E2868C}"/>
+              </a:ext>
+            </a:extLst>
+          </p:cNvPr>
+          <p:cNvSpPr txBox="1"/>
+          <p:nvPr/>
+        </p:nvSpPr>
+        <p:spPr>
+          <a:xfrm>
+            <a:off x="654057" y="1903693"/>
+            <a:ext cx="915635" cy="338554"/>
+          </a:xfrm>
+          <a:prstGeom prst="rect">
+            <a:avLst/>
+          </a:prstGeom>
+          <a:noFill/>
+        </p:spPr>
+        <p:txBody>
+          <a:bodyPr wrap="none" rtlCol="0">
+            <a:spAutoFit/>
+          </a:bodyPr>
+          <a:lstStyle/>
+          <a:p>
+            <a:r>
+              <a:rPr lang="en-US" sz="1600" dirty="0">
+                <a:latin typeface="Bookman Old Style" panose="02050604050505020204" pitchFamily="18" charset="0"/>
+              </a:rPr>
+              <a:t>HCPCS</a:t>
+            </a:r>
+          </a:p>
+        </p:txBody>
+      </p:sp>
     </p:spTree>
   </p:cSld>
   <p:clrMapOvr>

</xml_diff>